<commit_message>
Game of Life update
</commit_message>
<xml_diff>
--- a/documents/DataStructures.pptx
+++ b/documents/DataStructures.pptx
@@ -45,6 +45,7 @@
     <p:sldId id="294" r:id="rId39"/>
     <p:sldId id="296" r:id="rId40"/>
     <p:sldId id="298" r:id="rId41"/>
+    <p:sldId id="299" r:id="rId42"/>
   </p:sldIdLst>
   <p:sldSz cx="12192000" cy="6858000"/>
   <p:notesSz cx="6858000" cy="9144000"/>
@@ -3405,7 +3406,7 @@
           <a:p>
             <a:fld id="{A987F1E3-30AB-49C9-8E4C-2EF75BE827A3}" type="datetimeFigureOut">
               <a:rPr lang="en-US" smtClean="0"/>
-              <a:t>5/15/2021</a:t>
+              <a:t>5/22/2021</a:t>
             </a:fld>
             <a:endParaRPr lang="en-US"/>
           </a:p>
@@ -3603,7 +3604,7 @@
           <a:p>
             <a:fld id="{A987F1E3-30AB-49C9-8E4C-2EF75BE827A3}" type="datetimeFigureOut">
               <a:rPr lang="en-US" smtClean="0"/>
-              <a:t>5/15/2021</a:t>
+              <a:t>5/22/2021</a:t>
             </a:fld>
             <a:endParaRPr lang="en-US"/>
           </a:p>
@@ -3811,7 +3812,7 @@
           <a:p>
             <a:fld id="{A987F1E3-30AB-49C9-8E4C-2EF75BE827A3}" type="datetimeFigureOut">
               <a:rPr lang="en-US" smtClean="0"/>
-              <a:t>5/15/2021</a:t>
+              <a:t>5/22/2021</a:t>
             </a:fld>
             <a:endParaRPr lang="en-US"/>
           </a:p>
@@ -4009,7 +4010,7 @@
           <a:p>
             <a:fld id="{A987F1E3-30AB-49C9-8E4C-2EF75BE827A3}" type="datetimeFigureOut">
               <a:rPr lang="en-US" smtClean="0"/>
-              <a:t>5/15/2021</a:t>
+              <a:t>5/22/2021</a:t>
             </a:fld>
             <a:endParaRPr lang="en-US"/>
           </a:p>
@@ -4284,7 +4285,7 @@
           <a:p>
             <a:fld id="{A987F1E3-30AB-49C9-8E4C-2EF75BE827A3}" type="datetimeFigureOut">
               <a:rPr lang="en-US" smtClean="0"/>
-              <a:t>5/15/2021</a:t>
+              <a:t>5/22/2021</a:t>
             </a:fld>
             <a:endParaRPr lang="en-US"/>
           </a:p>
@@ -4549,7 +4550,7 @@
           <a:p>
             <a:fld id="{A987F1E3-30AB-49C9-8E4C-2EF75BE827A3}" type="datetimeFigureOut">
               <a:rPr lang="en-US" smtClean="0"/>
-              <a:t>5/15/2021</a:t>
+              <a:t>5/22/2021</a:t>
             </a:fld>
             <a:endParaRPr lang="en-US"/>
           </a:p>
@@ -4961,7 +4962,7 @@
           <a:p>
             <a:fld id="{A987F1E3-30AB-49C9-8E4C-2EF75BE827A3}" type="datetimeFigureOut">
               <a:rPr lang="en-US" smtClean="0"/>
-              <a:t>5/15/2021</a:t>
+              <a:t>5/22/2021</a:t>
             </a:fld>
             <a:endParaRPr lang="en-US"/>
           </a:p>
@@ -5102,7 +5103,7 @@
           <a:p>
             <a:fld id="{A987F1E3-30AB-49C9-8E4C-2EF75BE827A3}" type="datetimeFigureOut">
               <a:rPr lang="en-US" smtClean="0"/>
-              <a:t>5/15/2021</a:t>
+              <a:t>5/22/2021</a:t>
             </a:fld>
             <a:endParaRPr lang="en-US"/>
           </a:p>
@@ -5215,7 +5216,7 @@
           <a:p>
             <a:fld id="{A987F1E3-30AB-49C9-8E4C-2EF75BE827A3}" type="datetimeFigureOut">
               <a:rPr lang="en-US" smtClean="0"/>
-              <a:t>5/15/2021</a:t>
+              <a:t>5/22/2021</a:t>
             </a:fld>
             <a:endParaRPr lang="en-US"/>
           </a:p>
@@ -5526,7 +5527,7 @@
           <a:p>
             <a:fld id="{A987F1E3-30AB-49C9-8E4C-2EF75BE827A3}" type="datetimeFigureOut">
               <a:rPr lang="en-US" smtClean="0"/>
-              <a:t>5/15/2021</a:t>
+              <a:t>5/22/2021</a:t>
             </a:fld>
             <a:endParaRPr lang="en-US"/>
           </a:p>
@@ -5814,7 +5815,7 @@
           <a:p>
             <a:fld id="{A987F1E3-30AB-49C9-8E4C-2EF75BE827A3}" type="datetimeFigureOut">
               <a:rPr lang="en-US" smtClean="0"/>
-              <a:t>5/15/2021</a:t>
+              <a:t>5/22/2021</a:t>
             </a:fld>
             <a:endParaRPr lang="en-US"/>
           </a:p>
@@ -6055,7 +6056,7 @@
           <a:p>
             <a:fld id="{A987F1E3-30AB-49C9-8E4C-2EF75BE827A3}" type="datetimeFigureOut">
               <a:rPr lang="en-US" smtClean="0"/>
-              <a:t>5/15/2021</a:t>
+              <a:t>5/22/2021</a:t>
             </a:fld>
             <a:endParaRPr lang="en-US"/>
           </a:p>
@@ -26234,7 +26235,7 @@
         </p:nvSpPr>
         <p:spPr>
           <a:xfrm>
-            <a:off x="3031958" y="3164306"/>
+            <a:off x="2894798" y="4316450"/>
             <a:ext cx="2005264" cy="264694"/>
           </a:xfrm>
           <a:prstGeom prst="rect">
@@ -26280,7 +26281,7 @@
         </p:nvSpPr>
         <p:spPr>
           <a:xfrm>
-            <a:off x="3031958" y="3597443"/>
+            <a:off x="2894798" y="4749587"/>
             <a:ext cx="2005264" cy="264694"/>
           </a:xfrm>
           <a:prstGeom prst="rect">
@@ -26326,7 +26327,7 @@
         </p:nvSpPr>
         <p:spPr>
           <a:xfrm>
-            <a:off x="3031958" y="4030580"/>
+            <a:off x="2894798" y="5182724"/>
             <a:ext cx="2005264" cy="264694"/>
           </a:xfrm>
           <a:prstGeom prst="rect">
@@ -26372,7 +26373,7 @@
         </p:nvSpPr>
         <p:spPr>
           <a:xfrm>
-            <a:off x="3031958" y="4463717"/>
+            <a:off x="2894798" y="5615861"/>
             <a:ext cx="2005264" cy="264694"/>
           </a:xfrm>
           <a:prstGeom prst="rect">
@@ -26418,7 +26419,7 @@
         </p:nvCxnSpPr>
         <p:spPr>
           <a:xfrm flipH="1">
-            <a:off x="3031958" y="3429000"/>
+            <a:off x="2894798" y="4581144"/>
             <a:ext cx="2005264" cy="168443"/>
           </a:xfrm>
           <a:prstGeom prst="line">
@@ -26454,7 +26455,7 @@
         </p:nvCxnSpPr>
         <p:spPr>
           <a:xfrm flipH="1">
-            <a:off x="3031958" y="3862137"/>
+            <a:off x="2894798" y="5014281"/>
             <a:ext cx="2005264" cy="168443"/>
           </a:xfrm>
           <a:prstGeom prst="line">
@@ -26490,7 +26491,7 @@
         </p:nvCxnSpPr>
         <p:spPr>
           <a:xfrm flipH="1">
-            <a:off x="3031958" y="4295274"/>
+            <a:off x="2894798" y="5447418"/>
             <a:ext cx="2005264" cy="168443"/>
           </a:xfrm>
           <a:prstGeom prst="line">
@@ -26578,6 +26579,399 @@
             <a:r>
               <a:rPr lang="en-US" dirty="0"/>
               <a:t>n-1</a:t>
+            </a:r>
+          </a:p>
+        </p:txBody>
+      </p:sp>
+      <p:cxnSp>
+        <p:nvCxnSpPr>
+          <p:cNvPr id="9" name="Straight Arrow Connector 8">
+            <a:extLst>
+              <a:ext uri="{FF2B5EF4-FFF2-40B4-BE49-F238E27FC236}">
+                <a16:creationId xmlns:a16="http://schemas.microsoft.com/office/drawing/2014/main" id="{D4E6941C-C74D-4326-8D6B-1E443C88E6C6}"/>
+              </a:ext>
+            </a:extLst>
+          </p:cNvPr>
+          <p:cNvCxnSpPr/>
+          <p:nvPr/>
+        </p:nvCxnSpPr>
+        <p:spPr>
+          <a:xfrm>
+            <a:off x="5749719" y="2021305"/>
+            <a:ext cx="0" cy="344906"/>
+          </a:xfrm>
+          <a:prstGeom prst="straightConnector1">
+            <a:avLst/>
+          </a:prstGeom>
+          <a:ln>
+            <a:tailEnd type="triangle"/>
+          </a:ln>
+        </p:spPr>
+        <p:style>
+          <a:lnRef idx="1">
+            <a:schemeClr val="accent1"/>
+          </a:lnRef>
+          <a:fillRef idx="0">
+            <a:schemeClr val="accent1"/>
+          </a:fillRef>
+          <a:effectRef idx="0">
+            <a:schemeClr val="accent1"/>
+          </a:effectRef>
+          <a:fontRef idx="minor">
+            <a:schemeClr val="tx1"/>
+          </a:fontRef>
+        </p:style>
+      </p:cxnSp>
+      <p:sp>
+        <p:nvSpPr>
+          <p:cNvPr id="15" name="TextBox 14">
+            <a:extLst>
+              <a:ext uri="{FF2B5EF4-FFF2-40B4-BE49-F238E27FC236}">
+                <a16:creationId xmlns:a16="http://schemas.microsoft.com/office/drawing/2014/main" id="{7C47A95D-8A0A-41CD-AC74-BBA1D8D6713F}"/>
+              </a:ext>
+            </a:extLst>
+          </p:cNvPr>
+          <p:cNvSpPr txBox="1"/>
+          <p:nvPr/>
+        </p:nvSpPr>
+        <p:spPr>
+          <a:xfrm>
+            <a:off x="5403438" y="1679866"/>
+            <a:ext cx="692562" cy="369332"/>
+          </a:xfrm>
+          <a:prstGeom prst="rect">
+            <a:avLst/>
+          </a:prstGeom>
+          <a:noFill/>
+        </p:spPr>
+        <p:txBody>
+          <a:bodyPr wrap="none" rtlCol="0">
+            <a:spAutoFit/>
+          </a:bodyPr>
+          <a:lstStyle/>
+          <a:p>
+            <a:r>
+              <a:rPr lang="en-US" dirty="0"/>
+              <a:t>index</a:t>
+            </a:r>
+          </a:p>
+        </p:txBody>
+      </p:sp>
+      <p:cxnSp>
+        <p:nvCxnSpPr>
+          <p:cNvPr id="16" name="Straight Arrow Connector 15">
+            <a:extLst>
+              <a:ext uri="{FF2B5EF4-FFF2-40B4-BE49-F238E27FC236}">
+                <a16:creationId xmlns:a16="http://schemas.microsoft.com/office/drawing/2014/main" id="{1CB966A2-C14A-40B5-8ED5-5C9A90D5E8E4}"/>
+              </a:ext>
+            </a:extLst>
+          </p:cNvPr>
+          <p:cNvCxnSpPr>
+            <a:cxnSpLocks/>
+          </p:cNvCxnSpPr>
+          <p:nvPr/>
+        </p:nvCxnSpPr>
+        <p:spPr>
+          <a:xfrm>
+            <a:off x="3785616" y="4002645"/>
+            <a:ext cx="534202" cy="739403"/>
+          </a:xfrm>
+          <a:prstGeom prst="straightConnector1">
+            <a:avLst/>
+          </a:prstGeom>
+          <a:ln>
+            <a:tailEnd type="triangle"/>
+          </a:ln>
+        </p:spPr>
+        <p:style>
+          <a:lnRef idx="1">
+            <a:schemeClr val="accent1"/>
+          </a:lnRef>
+          <a:fillRef idx="0">
+            <a:schemeClr val="accent1"/>
+          </a:fillRef>
+          <a:effectRef idx="0">
+            <a:schemeClr val="accent1"/>
+          </a:effectRef>
+          <a:fontRef idx="minor">
+            <a:schemeClr val="tx1"/>
+          </a:fontRef>
+        </p:style>
+      </p:cxnSp>
+      <p:sp>
+        <p:nvSpPr>
+          <p:cNvPr id="17" name="TextBox 16">
+            <a:extLst>
+              <a:ext uri="{FF2B5EF4-FFF2-40B4-BE49-F238E27FC236}">
+                <a16:creationId xmlns:a16="http://schemas.microsoft.com/office/drawing/2014/main" id="{EB59E761-19FE-4949-A55F-72D85D756787}"/>
+              </a:ext>
+            </a:extLst>
+          </p:cNvPr>
+          <p:cNvSpPr txBox="1"/>
+          <p:nvPr/>
+        </p:nvSpPr>
+        <p:spPr>
+          <a:xfrm>
+            <a:off x="3360155" y="3666329"/>
+            <a:ext cx="692562" cy="369332"/>
+          </a:xfrm>
+          <a:prstGeom prst="rect">
+            <a:avLst/>
+          </a:prstGeom>
+          <a:noFill/>
+        </p:spPr>
+        <p:txBody>
+          <a:bodyPr wrap="none" rtlCol="0">
+            <a:spAutoFit/>
+          </a:bodyPr>
+          <a:lstStyle/>
+          <a:p>
+            <a:r>
+              <a:rPr lang="en-US" dirty="0"/>
+              <a:t>index</a:t>
+            </a:r>
+          </a:p>
+        </p:txBody>
+      </p:sp>
+      <p:sp>
+        <p:nvSpPr>
+          <p:cNvPr id="19" name="Rectangle 18">
+            <a:extLst>
+              <a:ext uri="{FF2B5EF4-FFF2-40B4-BE49-F238E27FC236}">
+                <a16:creationId xmlns:a16="http://schemas.microsoft.com/office/drawing/2014/main" id="{D7BF714A-49AE-47FE-A680-EF619932149C}"/>
+              </a:ext>
+            </a:extLst>
+          </p:cNvPr>
+          <p:cNvSpPr/>
+          <p:nvPr/>
+        </p:nvSpPr>
+        <p:spPr>
+          <a:xfrm>
+            <a:off x="5651381" y="2366211"/>
+            <a:ext cx="233894" cy="261486"/>
+          </a:xfrm>
+          <a:prstGeom prst="rect">
+            <a:avLst/>
+          </a:prstGeom>
+        </p:spPr>
+        <p:style>
+          <a:lnRef idx="2">
+            <a:schemeClr val="accent2">
+              <a:shade val="50000"/>
+            </a:schemeClr>
+          </a:lnRef>
+          <a:fillRef idx="1">
+            <a:schemeClr val="accent2"/>
+          </a:fillRef>
+          <a:effectRef idx="0">
+            <a:schemeClr val="accent2"/>
+          </a:effectRef>
+          <a:fontRef idx="minor">
+            <a:schemeClr val="lt1"/>
+          </a:fontRef>
+        </p:style>
+        <p:txBody>
+          <a:bodyPr rtlCol="0" anchor="ctr"/>
+          <a:lstStyle/>
+          <a:p>
+            <a:pPr algn="ctr"/>
+            <a:endParaRPr lang="en-US"/>
+          </a:p>
+        </p:txBody>
+      </p:sp>
+      <p:sp>
+        <p:nvSpPr>
+          <p:cNvPr id="20" name="Rectangle 19">
+            <a:extLst>
+              <a:ext uri="{FF2B5EF4-FFF2-40B4-BE49-F238E27FC236}">
+                <a16:creationId xmlns:a16="http://schemas.microsoft.com/office/drawing/2014/main" id="{432AA520-103C-44B5-A509-CF28BECD0665}"/>
+              </a:ext>
+            </a:extLst>
+          </p:cNvPr>
+          <p:cNvSpPr/>
+          <p:nvPr/>
+        </p:nvSpPr>
+        <p:spPr>
+          <a:xfrm>
+            <a:off x="4202871" y="4751190"/>
+            <a:ext cx="233894" cy="261486"/>
+          </a:xfrm>
+          <a:prstGeom prst="rect">
+            <a:avLst/>
+          </a:prstGeom>
+        </p:spPr>
+        <p:style>
+          <a:lnRef idx="2">
+            <a:schemeClr val="accent2">
+              <a:shade val="50000"/>
+            </a:schemeClr>
+          </a:lnRef>
+          <a:fillRef idx="1">
+            <a:schemeClr val="accent2"/>
+          </a:fillRef>
+          <a:effectRef idx="0">
+            <a:schemeClr val="accent2"/>
+          </a:effectRef>
+          <a:fontRef idx="minor">
+            <a:schemeClr val="lt1"/>
+          </a:fontRef>
+        </p:style>
+        <p:txBody>
+          <a:bodyPr rtlCol="0" anchor="ctr"/>
+          <a:lstStyle/>
+          <a:p>
+            <a:pPr algn="ctr"/>
+            <a:endParaRPr lang="en-US"/>
+          </a:p>
+        </p:txBody>
+      </p:sp>
+      <p:cxnSp>
+        <p:nvCxnSpPr>
+          <p:cNvPr id="22" name="Straight Arrow Connector 21">
+            <a:extLst>
+              <a:ext uri="{FF2B5EF4-FFF2-40B4-BE49-F238E27FC236}">
+                <a16:creationId xmlns:a16="http://schemas.microsoft.com/office/drawing/2014/main" id="{3501C95B-708F-4E9C-A4FC-0F8FB7296E76}"/>
+              </a:ext>
+            </a:extLst>
+          </p:cNvPr>
+          <p:cNvCxnSpPr>
+            <a:cxnSpLocks/>
+            <a:endCxn id="20" idx="2"/>
+          </p:cNvCxnSpPr>
+          <p:nvPr/>
+        </p:nvCxnSpPr>
+        <p:spPr>
+          <a:xfrm flipV="1">
+            <a:off x="4319818" y="5012676"/>
+            <a:ext cx="0" cy="1186956"/>
+          </a:xfrm>
+          <a:prstGeom prst="straightConnector1">
+            <a:avLst/>
+          </a:prstGeom>
+          <a:ln>
+            <a:tailEnd type="triangle"/>
+          </a:ln>
+        </p:spPr>
+        <p:style>
+          <a:lnRef idx="1">
+            <a:schemeClr val="accent1"/>
+          </a:lnRef>
+          <a:fillRef idx="0">
+            <a:schemeClr val="accent1"/>
+          </a:fillRef>
+          <a:effectRef idx="0">
+            <a:schemeClr val="accent1"/>
+          </a:effectRef>
+          <a:fontRef idx="minor">
+            <a:schemeClr val="tx1"/>
+          </a:fontRef>
+        </p:style>
+      </p:cxnSp>
+      <p:sp>
+        <p:nvSpPr>
+          <p:cNvPr id="23" name="TextBox 22">
+            <a:extLst>
+              <a:ext uri="{FF2B5EF4-FFF2-40B4-BE49-F238E27FC236}">
+                <a16:creationId xmlns:a16="http://schemas.microsoft.com/office/drawing/2014/main" id="{6DA0C5F1-FEED-4E8F-9AD3-0C021CB645FD}"/>
+              </a:ext>
+            </a:extLst>
+          </p:cNvPr>
+          <p:cNvSpPr txBox="1"/>
+          <p:nvPr/>
+        </p:nvSpPr>
+        <p:spPr>
+          <a:xfrm>
+            <a:off x="4152713" y="6099188"/>
+            <a:ext cx="284052" cy="369332"/>
+          </a:xfrm>
+          <a:prstGeom prst="rect">
+            <a:avLst/>
+          </a:prstGeom>
+          <a:noFill/>
+        </p:spPr>
+        <p:txBody>
+          <a:bodyPr wrap="none" rtlCol="0">
+            <a:spAutoFit/>
+          </a:bodyPr>
+          <a:lstStyle/>
+          <a:p>
+            <a:r>
+              <a:rPr lang="en-US" dirty="0"/>
+              <a:t>x</a:t>
+            </a:r>
+          </a:p>
+        </p:txBody>
+      </p:sp>
+      <p:cxnSp>
+        <p:nvCxnSpPr>
+          <p:cNvPr id="25" name="Straight Arrow Connector 24">
+            <a:extLst>
+              <a:ext uri="{FF2B5EF4-FFF2-40B4-BE49-F238E27FC236}">
+                <a16:creationId xmlns:a16="http://schemas.microsoft.com/office/drawing/2014/main" id="{23668467-0F0A-4485-8834-80D3C3D1C994}"/>
+              </a:ext>
+            </a:extLst>
+          </p:cNvPr>
+          <p:cNvCxnSpPr/>
+          <p:nvPr/>
+        </p:nvCxnSpPr>
+        <p:spPr>
+          <a:xfrm flipH="1">
+            <a:off x="4436765" y="4877602"/>
+            <a:ext cx="1077067" cy="0"/>
+          </a:xfrm>
+          <a:prstGeom prst="straightConnector1">
+            <a:avLst/>
+          </a:prstGeom>
+          <a:ln>
+            <a:tailEnd type="triangle"/>
+          </a:ln>
+        </p:spPr>
+        <p:style>
+          <a:lnRef idx="1">
+            <a:schemeClr val="accent1"/>
+          </a:lnRef>
+          <a:fillRef idx="0">
+            <a:schemeClr val="accent1"/>
+          </a:fillRef>
+          <a:effectRef idx="0">
+            <a:schemeClr val="accent1"/>
+          </a:effectRef>
+          <a:fontRef idx="minor">
+            <a:schemeClr val="tx1"/>
+          </a:fontRef>
+        </p:style>
+      </p:cxnSp>
+      <p:sp>
+        <p:nvSpPr>
+          <p:cNvPr id="26" name="TextBox 25">
+            <a:extLst>
+              <a:ext uri="{FF2B5EF4-FFF2-40B4-BE49-F238E27FC236}">
+                <a16:creationId xmlns:a16="http://schemas.microsoft.com/office/drawing/2014/main" id="{DD7DFB0B-2EFB-40D4-AED8-7EB1E6AECFD8}"/>
+              </a:ext>
+            </a:extLst>
+          </p:cNvPr>
+          <p:cNvSpPr txBox="1"/>
+          <p:nvPr/>
+        </p:nvSpPr>
+        <p:spPr>
+          <a:xfrm>
+            <a:off x="5498272" y="4665504"/>
+            <a:ext cx="288862" cy="369332"/>
+          </a:xfrm>
+          <a:prstGeom prst="rect">
+            <a:avLst/>
+          </a:prstGeom>
+          <a:noFill/>
+        </p:spPr>
+        <p:txBody>
+          <a:bodyPr wrap="none" rtlCol="0">
+            <a:spAutoFit/>
+          </a:bodyPr>
+          <a:lstStyle/>
+          <a:p>
+            <a:r>
+              <a:rPr lang="en-US" dirty="0"/>
+              <a:t>y</a:t>
             </a:r>
           </a:p>
         </p:txBody>
@@ -36992,6 +37386,184 @@
     <p:extLst>
       <p:ext uri="{BB962C8B-B14F-4D97-AF65-F5344CB8AC3E}">
         <p14:creationId xmlns:p14="http://schemas.microsoft.com/office/powerpoint/2010/main" val="1318164771"/>
+      </p:ext>
+    </p:extLst>
+  </p:cSld>
+  <p:clrMapOvr>
+    <a:masterClrMapping/>
+  </p:clrMapOvr>
+</p:sld>
+</file>
+
+<file path=ppt/slides/slide41.xml><?xml version="1.0" encoding="utf-8"?>
+<p:sld xmlns:a="http://schemas.openxmlformats.org/drawingml/2006/main" xmlns:r="http://schemas.openxmlformats.org/officeDocument/2006/relationships" xmlns:p="http://schemas.openxmlformats.org/presentationml/2006/main">
+  <p:cSld>
+    <p:spTree>
+      <p:nvGrpSpPr>
+        <p:cNvPr id="1" name=""/>
+        <p:cNvGrpSpPr/>
+        <p:nvPr/>
+      </p:nvGrpSpPr>
+      <p:grpSpPr>
+        <a:xfrm>
+          <a:off x="0" y="0"/>
+          <a:ext cx="0" cy="0"/>
+          <a:chOff x="0" y="0"/>
+          <a:chExt cx="0" cy="0"/>
+        </a:xfrm>
+      </p:grpSpPr>
+      <p:sp>
+        <p:nvSpPr>
+          <p:cNvPr id="2" name="Title 1">
+            <a:extLst>
+              <a:ext uri="{FF2B5EF4-FFF2-40B4-BE49-F238E27FC236}">
+                <a16:creationId xmlns:a16="http://schemas.microsoft.com/office/drawing/2014/main" id="{BB19A44B-05F7-4F7F-8300-150665DCC42A}"/>
+              </a:ext>
+            </a:extLst>
+          </p:cNvPr>
+          <p:cNvSpPr>
+            <a:spLocks noGrp="1"/>
+          </p:cNvSpPr>
+          <p:nvPr>
+            <p:ph type="title"/>
+          </p:nvPr>
+        </p:nvSpPr>
+        <p:spPr/>
+        <p:txBody>
+          <a:bodyPr/>
+          <a:lstStyle/>
+          <a:p>
+            <a:r>
+              <a:rPr lang="en-US" dirty="0"/>
+              <a:t>Random number generation</a:t>
+            </a:r>
+          </a:p>
+        </p:txBody>
+      </p:sp>
+      <p:cxnSp>
+        <p:nvCxnSpPr>
+          <p:cNvPr id="5" name="Straight Connector 4">
+            <a:extLst>
+              <a:ext uri="{FF2B5EF4-FFF2-40B4-BE49-F238E27FC236}">
+                <a16:creationId xmlns:a16="http://schemas.microsoft.com/office/drawing/2014/main" id="{48ADAE0A-D4C3-4931-BE33-4D747CE98BAC}"/>
+              </a:ext>
+            </a:extLst>
+          </p:cNvPr>
+          <p:cNvCxnSpPr/>
+          <p:nvPr/>
+        </p:nvCxnSpPr>
+        <p:spPr>
+          <a:xfrm>
+            <a:off x="2879558" y="3721768"/>
+            <a:ext cx="5614737" cy="0"/>
+          </a:xfrm>
+          <a:prstGeom prst="line">
+            <a:avLst/>
+          </a:prstGeom>
+        </p:spPr>
+        <p:style>
+          <a:lnRef idx="3">
+            <a:schemeClr val="accent1"/>
+          </a:lnRef>
+          <a:fillRef idx="0">
+            <a:schemeClr val="accent1"/>
+          </a:fillRef>
+          <a:effectRef idx="2">
+            <a:schemeClr val="accent1"/>
+          </a:effectRef>
+          <a:fontRef idx="minor">
+            <a:schemeClr val="tx1"/>
+          </a:fontRef>
+        </p:style>
+      </p:cxnSp>
+      <p:sp>
+        <p:nvSpPr>
+          <p:cNvPr id="11" name="Rectangle 10">
+            <a:extLst>
+              <a:ext uri="{FF2B5EF4-FFF2-40B4-BE49-F238E27FC236}">
+                <a16:creationId xmlns:a16="http://schemas.microsoft.com/office/drawing/2014/main" id="{D1025662-0A12-4EF8-A828-FC3FB1D60EC7}"/>
+              </a:ext>
+            </a:extLst>
+          </p:cNvPr>
+          <p:cNvSpPr/>
+          <p:nvPr/>
+        </p:nvSpPr>
+        <p:spPr>
+          <a:xfrm>
+            <a:off x="2879558" y="2783305"/>
+            <a:ext cx="5614737" cy="818148"/>
+          </a:xfrm>
+          <a:prstGeom prst="rect">
+            <a:avLst/>
+          </a:prstGeom>
+        </p:spPr>
+        <p:style>
+          <a:lnRef idx="2">
+            <a:schemeClr val="accent4">
+              <a:shade val="50000"/>
+            </a:schemeClr>
+          </a:lnRef>
+          <a:fillRef idx="1">
+            <a:schemeClr val="accent4"/>
+          </a:fillRef>
+          <a:effectRef idx="0">
+            <a:schemeClr val="accent4"/>
+          </a:effectRef>
+          <a:fontRef idx="minor">
+            <a:schemeClr val="lt1"/>
+          </a:fontRef>
+        </p:style>
+        <p:txBody>
+          <a:bodyPr rtlCol="0" anchor="ctr"/>
+          <a:lstStyle/>
+          <a:p>
+            <a:pPr algn="ctr"/>
+            <a:endParaRPr lang="en-US"/>
+          </a:p>
+        </p:txBody>
+      </p:sp>
+      <p:cxnSp>
+        <p:nvCxnSpPr>
+          <p:cNvPr id="10" name="Straight Connector 9">
+            <a:extLst>
+              <a:ext uri="{FF2B5EF4-FFF2-40B4-BE49-F238E27FC236}">
+                <a16:creationId xmlns:a16="http://schemas.microsoft.com/office/drawing/2014/main" id="{15F20017-D750-4E1E-A5E8-39D610216FCD}"/>
+              </a:ext>
+            </a:extLst>
+          </p:cNvPr>
+          <p:cNvCxnSpPr>
+            <a:cxnSpLocks/>
+          </p:cNvCxnSpPr>
+          <p:nvPr/>
+        </p:nvCxnSpPr>
+        <p:spPr>
+          <a:xfrm>
+            <a:off x="4419599" y="2462464"/>
+            <a:ext cx="0" cy="1538037"/>
+          </a:xfrm>
+          <a:prstGeom prst="line">
+            <a:avLst/>
+          </a:prstGeom>
+        </p:spPr>
+        <p:style>
+          <a:lnRef idx="1">
+            <a:schemeClr val="accent1"/>
+          </a:lnRef>
+          <a:fillRef idx="0">
+            <a:schemeClr val="accent1"/>
+          </a:fillRef>
+          <a:effectRef idx="0">
+            <a:schemeClr val="accent1"/>
+          </a:effectRef>
+          <a:fontRef idx="minor">
+            <a:schemeClr val="tx1"/>
+          </a:fontRef>
+        </p:style>
+      </p:cxnSp>
+    </p:spTree>
+    <p:extLst>
+      <p:ext uri="{BB962C8B-B14F-4D97-AF65-F5344CB8AC3E}">
+        <p14:creationId xmlns:p14="http://schemas.microsoft.com/office/powerpoint/2010/main" val="3165143231"/>
       </p:ext>
     </p:extLst>
   </p:cSld>

</xml_diff>